<commit_message>
New content and a new image
</commit_message>
<xml_diff>
--- a/Current/WindowsOnRaspberryPi/Win10onTheRaspPi.pptx
+++ b/Current/WindowsOnRaspberryPi/Win10onTheRaspPi.pptx
@@ -15,9 +15,14 @@
     <p:sldId id="264" r:id="rId9"/>
     <p:sldId id="265" r:id="rId10"/>
     <p:sldId id="266" r:id="rId11"/>
+    <p:sldId id="267" r:id="rId12"/>
+    <p:sldId id="268" r:id="rId13"/>
+    <p:sldId id="269" r:id="rId14"/>
+    <p:sldId id="270" r:id="rId15"/>
+    <p:sldId id="271" r:id="rId16"/>
   </p:sldIdLst>
   <p:sldSz cx="12192000" cy="6858000"/>
-  <p:notesSz cx="6858000" cy="9144000"/>
+  <p:notesSz cx="6888163" cy="10020300"/>
   <p:defaultTextStyle>
     <a:defPPr>
       <a:defRPr lang="en-US"/>
@@ -2745,8 +2750,8 @@
         </p:nvSpPr>
         <p:spPr>
           <a:xfrm>
-            <a:off x="889233" y="318782"/>
-            <a:ext cx="10654018" cy="923330"/>
+            <a:off x="864066" y="260059"/>
+            <a:ext cx="10654018" cy="6463308"/>
           </a:xfrm>
           <a:prstGeom prst="rect">
             <a:avLst/>
@@ -2786,12 +2791,178 @@
             </a:r>
             <a:r>
               <a:rPr lang="en-GB" dirty="0"/>
-              <a:t> the ability to send and receive messages to and from anywhere in the </a:t>
-            </a:r>
-            <a:r>
-              <a:rPr lang="en-GB"/>
-              <a:t>world.</a:t>
-            </a:r>
+              <a:t> the ability to send and receive messages to and from anywhere in the world.</a:t>
+            </a:r>
+          </a:p>
+          <a:p>
+            <a:endParaRPr lang="en-GB" dirty="0"/>
+          </a:p>
+          <a:p>
+            <a:endParaRPr lang="en-GB" dirty="0"/>
+          </a:p>
+          <a:p>
+            <a:r>
+              <a:rPr lang="en-GB" dirty="0"/>
+              <a:t>Azure </a:t>
+            </a:r>
+            <a:r>
+              <a:rPr lang="en-GB" dirty="0" err="1"/>
+              <a:t>IoT</a:t>
+            </a:r>
+            <a:r>
+              <a:rPr lang="en-GB" dirty="0"/>
+              <a:t> Hub</a:t>
+            </a:r>
+          </a:p>
+          <a:p>
+            <a:endParaRPr lang="en-GB" dirty="0"/>
+          </a:p>
+          <a:p>
+            <a:r>
+              <a:rPr lang="en-GB" dirty="0"/>
+              <a:t>Azure </a:t>
+            </a:r>
+            <a:r>
+              <a:rPr lang="en-GB" dirty="0" err="1"/>
+              <a:t>IoT</a:t>
+            </a:r>
+            <a:r>
+              <a:rPr lang="en-GB" dirty="0"/>
+              <a:t> Hub is a fully managed service that enables reliable and secure bidirectional communications between millions of </a:t>
+            </a:r>
+            <a:r>
+              <a:rPr lang="en-GB" dirty="0" err="1"/>
+              <a:t>IoT</a:t>
+            </a:r>
+            <a:r>
+              <a:rPr lang="en-GB" dirty="0"/>
+              <a:t> devices and a solution back end.  Azure </a:t>
+            </a:r>
+            <a:r>
+              <a:rPr lang="en-GB" dirty="0" err="1"/>
+              <a:t>IoT</a:t>
+            </a:r>
+            <a:r>
+              <a:rPr lang="en-GB" dirty="0"/>
+              <a:t> Hub:</a:t>
+            </a:r>
+          </a:p>
+          <a:p>
+            <a:endParaRPr lang="en-GB" dirty="0"/>
+          </a:p>
+          <a:p>
+            <a:pPr marL="285750" indent="-285750">
+              <a:buFont typeface="Arial" panose="020B0604020202020204" pitchFamily="34" charset="0"/>
+              <a:buChar char="•"/>
+            </a:pPr>
+            <a:r>
+              <a:rPr lang="en-GB" dirty="0"/>
+              <a:t>Provides reliable device-to-cloud and cloud-to-device messaging at scale.</a:t>
+            </a:r>
+          </a:p>
+          <a:p>
+            <a:pPr marL="285750" indent="-285750">
+              <a:buFont typeface="Arial" panose="020B0604020202020204" pitchFamily="34" charset="0"/>
+              <a:buChar char="•"/>
+            </a:pPr>
+            <a:r>
+              <a:rPr lang="en-GB" dirty="0"/>
+              <a:t>Enables secure communications using per-device security credentials and access control.</a:t>
+            </a:r>
+          </a:p>
+          <a:p>
+            <a:pPr marL="285750" indent="-285750">
+              <a:buFont typeface="Arial" panose="020B0604020202020204" pitchFamily="34" charset="0"/>
+              <a:buChar char="•"/>
+            </a:pPr>
+            <a:r>
+              <a:rPr lang="en-GB" dirty="0"/>
+              <a:t>Provides extensive monitoring for device connectivity and device identity management events.</a:t>
+            </a:r>
+          </a:p>
+          <a:p>
+            <a:pPr marL="285750" indent="-285750">
+              <a:buFont typeface="Arial" panose="020B0604020202020204" pitchFamily="34" charset="0"/>
+              <a:buChar char="•"/>
+            </a:pPr>
+            <a:r>
+              <a:rPr lang="en-GB" dirty="0"/>
+              <a:t>Includes device libraries for the most popular languages and platforms.</a:t>
+            </a:r>
+          </a:p>
+          <a:p>
+            <a:pPr marL="285750" indent="-285750">
+              <a:buFont typeface="Arial" panose="020B0604020202020204" pitchFamily="34" charset="0"/>
+              <a:buChar char="•"/>
+            </a:pPr>
+            <a:endParaRPr lang="en-GB" dirty="0"/>
+          </a:p>
+          <a:p>
+            <a:r>
+              <a:rPr lang="en-GB" dirty="0"/>
+              <a:t>Why use Azure </a:t>
+            </a:r>
+            <a:r>
+              <a:rPr lang="en-GB" dirty="0" err="1"/>
+              <a:t>IoT</a:t>
+            </a:r>
+            <a:r>
+              <a:rPr lang="en-GB" dirty="0"/>
+              <a:t> Hub</a:t>
+            </a:r>
+          </a:p>
+          <a:p>
+            <a:endParaRPr lang="en-GB" dirty="0"/>
+          </a:p>
+          <a:p>
+            <a:pPr marL="285750" indent="-285750">
+              <a:buFont typeface="Arial" panose="020B0604020202020204" pitchFamily="34" charset="0"/>
+              <a:buChar char="•"/>
+            </a:pPr>
+            <a:r>
+              <a:rPr lang="en-GB" dirty="0"/>
+              <a:t>Device Security – Each device get its own security key to connect to Azure. And Azure has a registry of devices, which allows you to grant/deny access.</a:t>
+            </a:r>
+          </a:p>
+          <a:p>
+            <a:pPr marL="285750" indent="-285750">
+              <a:buFont typeface="Arial" panose="020B0604020202020204" pitchFamily="34" charset="0"/>
+              <a:buChar char="•"/>
+            </a:pPr>
+            <a:r>
+              <a:rPr lang="en-GB" dirty="0"/>
+              <a:t>Device Monitoring – You can get operation logs from your device, which could be used to alert you to failures.</a:t>
+            </a:r>
+          </a:p>
+          <a:p>
+            <a:pPr marL="285750" indent="-285750">
+              <a:buFont typeface="Arial" panose="020B0604020202020204" pitchFamily="34" charset="0"/>
+              <a:buChar char="•"/>
+            </a:pPr>
+            <a:r>
+              <a:rPr lang="en-GB" dirty="0"/>
+              <a:t>Device Libraries – There is an extensive list of libraries available support a multitude of devices.</a:t>
+            </a:r>
+          </a:p>
+          <a:p>
+            <a:pPr marL="285750" indent="-285750">
+              <a:buFont typeface="Arial" panose="020B0604020202020204" pitchFamily="34" charset="0"/>
+              <a:buChar char="•"/>
+            </a:pPr>
+            <a:r>
+              <a:rPr lang="en-GB" dirty="0"/>
+              <a:t>Common Protocols Available – The </a:t>
+            </a:r>
+            <a:r>
+              <a:rPr lang="en-GB" dirty="0" err="1"/>
+              <a:t>IoT</a:t>
+            </a:r>
+            <a:r>
+              <a:rPr lang="en-GB" dirty="0"/>
+              <a:t> Hub also exposes common protocols such as HTTP, MQTT &amp; AMQP.</a:t>
+            </a:r>
+          </a:p>
+          <a:p>
             <a:endParaRPr lang="en-GB" dirty="0"/>
           </a:p>
         </p:txBody>
@@ -2800,6 +2971,844 @@
     <p:extLst>
       <p:ext uri="{BB962C8B-B14F-4D97-AF65-F5344CB8AC3E}">
         <p14:creationId xmlns:p14="http://schemas.microsoft.com/office/powerpoint/2010/main" val="2201664182"/>
+      </p:ext>
+    </p:extLst>
+  </p:cSld>
+  <p:clrMapOvr>
+    <a:masterClrMapping/>
+  </p:clrMapOvr>
+</p:sld>
+</file>
+
+<file path=ppt/slides/slide11.xml><?xml version="1.0" encoding="utf-8"?>
+<p:sld xmlns:a="http://schemas.openxmlformats.org/drawingml/2006/main" xmlns:r="http://schemas.openxmlformats.org/officeDocument/2006/relationships" xmlns:p="http://schemas.openxmlformats.org/presentationml/2006/main">
+  <p:cSld>
+    <p:spTree>
+      <p:nvGrpSpPr>
+        <p:cNvPr id="1" name=""/>
+        <p:cNvGrpSpPr/>
+        <p:nvPr/>
+      </p:nvGrpSpPr>
+      <p:grpSpPr>
+        <a:xfrm>
+          <a:off x="0" y="0"/>
+          <a:ext cx="0" cy="0"/>
+          <a:chOff x="0" y="0"/>
+          <a:chExt cx="0" cy="0"/>
+        </a:xfrm>
+      </p:grpSpPr>
+      <p:sp>
+        <p:nvSpPr>
+          <p:cNvPr id="2" name="TextBox 1"/>
+          <p:cNvSpPr txBox="1"/>
+          <p:nvPr/>
+        </p:nvSpPr>
+        <p:spPr>
+          <a:xfrm>
+            <a:off x="1023457" y="276837"/>
+            <a:ext cx="9110444" cy="369332"/>
+          </a:xfrm>
+          <a:prstGeom prst="rect">
+            <a:avLst/>
+          </a:prstGeom>
+          <a:noFill/>
+        </p:spPr>
+        <p:txBody>
+          <a:bodyPr wrap="square" rtlCol="0">
+            <a:spAutoFit/>
+          </a:bodyPr>
+          <a:lstStyle/>
+          <a:p>
+            <a:r>
+              <a:rPr lang="en-GB" dirty="0"/>
+              <a:t>Common Architecture</a:t>
+            </a:r>
+          </a:p>
+        </p:txBody>
+      </p:sp>
+      <p:pic>
+        <p:nvPicPr>
+          <p:cNvPr id="3" name="Picture 2"/>
+          <p:cNvPicPr>
+            <a:picLocks noChangeAspect="1"/>
+          </p:cNvPicPr>
+          <p:nvPr/>
+        </p:nvPicPr>
+        <p:blipFill>
+          <a:blip r:embed="rId2">
+            <a:extLst>
+              <a:ext uri="{28A0092B-C50C-407E-A947-70E740481C1C}">
+                <a14:useLocalDpi xmlns:a14="http://schemas.microsoft.com/office/drawing/2010/main" val="0"/>
+              </a:ext>
+            </a:extLst>
+          </a:blip>
+          <a:stretch>
+            <a:fillRect/>
+          </a:stretch>
+        </p:blipFill>
+        <p:spPr>
+          <a:xfrm>
+            <a:off x="3514989" y="646169"/>
+            <a:ext cx="5128468" cy="3543904"/>
+          </a:xfrm>
+          <a:prstGeom prst="rect">
+            <a:avLst/>
+          </a:prstGeom>
+        </p:spPr>
+      </p:pic>
+      <p:sp>
+        <p:nvSpPr>
+          <p:cNvPr id="4" name="TextBox 3"/>
+          <p:cNvSpPr txBox="1"/>
+          <p:nvPr/>
+        </p:nvSpPr>
+        <p:spPr>
+          <a:xfrm>
+            <a:off x="1023457" y="4190073"/>
+            <a:ext cx="10212200" cy="2031325"/>
+          </a:xfrm>
+          <a:prstGeom prst="rect">
+            <a:avLst/>
+          </a:prstGeom>
+          <a:noFill/>
+        </p:spPr>
+        <p:txBody>
+          <a:bodyPr wrap="square" rtlCol="0">
+            <a:spAutoFit/>
+          </a:bodyPr>
+          <a:lstStyle/>
+          <a:p>
+            <a:r>
+              <a:rPr lang="en-GB" dirty="0"/>
+              <a:t>A common </a:t>
+            </a:r>
+            <a:r>
+              <a:rPr lang="en-GB" dirty="0" err="1"/>
+              <a:t>IoT</a:t>
+            </a:r>
+            <a:r>
+              <a:rPr lang="en-GB" dirty="0"/>
+              <a:t> architecture may look something like this.</a:t>
+            </a:r>
+          </a:p>
+          <a:p>
+            <a:endParaRPr lang="en-GB" dirty="0"/>
+          </a:p>
+          <a:p>
+            <a:pPr marL="285750" indent="-285750">
+              <a:buFont typeface="Arial" panose="020B0604020202020204" pitchFamily="34" charset="0"/>
+              <a:buChar char="•"/>
+            </a:pPr>
+            <a:r>
+              <a:rPr lang="en-GB" dirty="0"/>
+              <a:t>We have devices out in the field collecting data, and they connect to the Cloud Gateway.</a:t>
+            </a:r>
+          </a:p>
+          <a:p>
+            <a:pPr marL="285750" indent="-285750">
+              <a:buFont typeface="Arial" panose="020B0604020202020204" pitchFamily="34" charset="0"/>
+              <a:buChar char="•"/>
+            </a:pPr>
+            <a:r>
+              <a:rPr lang="en-GB" dirty="0"/>
+              <a:t>Most of the data processing and analytics will happen in the </a:t>
+            </a:r>
+            <a:r>
+              <a:rPr lang="en-GB" dirty="0" err="1"/>
+              <a:t>IoT</a:t>
+            </a:r>
+            <a:r>
+              <a:rPr lang="en-GB" dirty="0"/>
+              <a:t> solution backend. You may want to filter and aggregate the data coming in or react to an alert by sending out a command or notification.</a:t>
+            </a:r>
+          </a:p>
+          <a:p>
+            <a:pPr marL="285750" indent="-285750">
+              <a:buFont typeface="Arial" panose="020B0604020202020204" pitchFamily="34" charset="0"/>
+              <a:buChar char="•"/>
+            </a:pPr>
+            <a:r>
+              <a:rPr lang="en-GB" dirty="0"/>
+              <a:t>The presentation layer could allow users to interact with the devices in the field or display the aggregated data in a dashboard or as a data feed for external systems to consume.</a:t>
+            </a:r>
+          </a:p>
+        </p:txBody>
+      </p:sp>
+    </p:spTree>
+    <p:extLst>
+      <p:ext uri="{BB962C8B-B14F-4D97-AF65-F5344CB8AC3E}">
+        <p14:creationId xmlns:p14="http://schemas.microsoft.com/office/powerpoint/2010/main" val="4082743067"/>
+      </p:ext>
+    </p:extLst>
+  </p:cSld>
+  <p:clrMapOvr>
+    <a:masterClrMapping/>
+  </p:clrMapOvr>
+</p:sld>
+</file>
+
+<file path=ppt/slides/slide12.xml><?xml version="1.0" encoding="utf-8"?>
+<p:sld xmlns:a="http://schemas.openxmlformats.org/drawingml/2006/main" xmlns:r="http://schemas.openxmlformats.org/officeDocument/2006/relationships" xmlns:p="http://schemas.openxmlformats.org/presentationml/2006/main">
+  <p:cSld>
+    <p:spTree>
+      <p:nvGrpSpPr>
+        <p:cNvPr id="1" name=""/>
+        <p:cNvGrpSpPr/>
+        <p:nvPr/>
+      </p:nvGrpSpPr>
+      <p:grpSpPr>
+        <a:xfrm>
+          <a:off x="0" y="0"/>
+          <a:ext cx="0" cy="0"/>
+          <a:chOff x="0" y="0"/>
+          <a:chExt cx="0" cy="0"/>
+        </a:xfrm>
+      </p:grpSpPr>
+      <p:sp>
+        <p:nvSpPr>
+          <p:cNvPr id="2" name="TextBox 1"/>
+          <p:cNvSpPr txBox="1"/>
+          <p:nvPr/>
+        </p:nvSpPr>
+        <p:spPr>
+          <a:xfrm>
+            <a:off x="998290" y="377505"/>
+            <a:ext cx="10452682" cy="5632311"/>
+          </a:xfrm>
+          <a:prstGeom prst="rect">
+            <a:avLst/>
+          </a:prstGeom>
+          <a:noFill/>
+        </p:spPr>
+        <p:txBody>
+          <a:bodyPr wrap="square" rtlCol="0">
+            <a:spAutoFit/>
+          </a:bodyPr>
+          <a:lstStyle/>
+          <a:p>
+            <a:r>
+              <a:rPr lang="en-GB" dirty="0"/>
+              <a:t>Azure </a:t>
+            </a:r>
+            <a:r>
+              <a:rPr lang="en-GB" dirty="0" err="1"/>
+              <a:t>IoT</a:t>
+            </a:r>
+            <a:r>
+              <a:rPr lang="en-GB" dirty="0"/>
+              <a:t> Hub Demo</a:t>
+            </a:r>
+          </a:p>
+          <a:p>
+            <a:endParaRPr lang="en-GB" dirty="0"/>
+          </a:p>
+          <a:p>
+            <a:r>
+              <a:rPr lang="en-GB" dirty="0"/>
+              <a:t>Create and </a:t>
+            </a:r>
+            <a:r>
+              <a:rPr lang="en-GB" dirty="0" err="1"/>
+              <a:t>IoT</a:t>
+            </a:r>
+            <a:r>
+              <a:rPr lang="en-GB" dirty="0"/>
+              <a:t> Hub</a:t>
+            </a:r>
+          </a:p>
+          <a:p>
+            <a:pPr marL="742950" lvl="1" indent="-285750">
+              <a:buFont typeface="Arial" panose="020B0604020202020204" pitchFamily="34" charset="0"/>
+              <a:buChar char="•"/>
+            </a:pPr>
+            <a:r>
+              <a:rPr lang="en-GB" dirty="0"/>
+              <a:t>Sign into your Azure account</a:t>
+            </a:r>
+          </a:p>
+          <a:p>
+            <a:pPr marL="742950" lvl="1" indent="-285750">
+              <a:buFont typeface="Arial" panose="020B0604020202020204" pitchFamily="34" charset="0"/>
+              <a:buChar char="•"/>
+            </a:pPr>
+            <a:r>
+              <a:rPr lang="en-GB" dirty="0"/>
+              <a:t>Click New &gt; Internet of Things &gt; Azure </a:t>
+            </a:r>
+            <a:r>
+              <a:rPr lang="en-GB" dirty="0" err="1"/>
+              <a:t>IoT</a:t>
+            </a:r>
+            <a:r>
+              <a:rPr lang="en-GB" dirty="0"/>
+              <a:t> Hub</a:t>
+            </a:r>
+          </a:p>
+          <a:p>
+            <a:pPr marL="742950" lvl="1" indent="-285750">
+              <a:buFont typeface="Arial" panose="020B0604020202020204" pitchFamily="34" charset="0"/>
+              <a:buChar char="•"/>
+            </a:pPr>
+            <a:r>
+              <a:rPr lang="en-GB" dirty="0"/>
+              <a:t>Finish the setup of your hub by giving it a Name, a Resource Group &amp; Location</a:t>
+            </a:r>
+          </a:p>
+          <a:p>
+            <a:pPr marL="742950" lvl="1" indent="-285750">
+              <a:buFont typeface="Arial" panose="020B0604020202020204" pitchFamily="34" charset="0"/>
+              <a:buChar char="•"/>
+            </a:pPr>
+            <a:r>
+              <a:rPr lang="en-GB" dirty="0"/>
+              <a:t>Once the Hub has been setup in Azure, take note of the Hostname and Access Key.</a:t>
+            </a:r>
+          </a:p>
+          <a:p>
+            <a:endParaRPr lang="en-GB" dirty="0"/>
+          </a:p>
+          <a:p>
+            <a:r>
+              <a:rPr lang="en-GB" dirty="0"/>
+              <a:t>Create a Backend Processor</a:t>
+            </a:r>
+          </a:p>
+          <a:p>
+            <a:pPr marL="742950" lvl="1" indent="-285750">
+              <a:buFont typeface="Arial" panose="020B0604020202020204" pitchFamily="34" charset="0"/>
+              <a:buChar char="•"/>
+            </a:pPr>
+            <a:r>
+              <a:rPr lang="en-GB" dirty="0"/>
+              <a:t>In Visual Studio, Create a new Console Application Project.</a:t>
+            </a:r>
+          </a:p>
+          <a:p>
+            <a:pPr marL="742950" lvl="1" indent="-285750">
+              <a:buFont typeface="Arial" panose="020B0604020202020204" pitchFamily="34" charset="0"/>
+              <a:buChar char="•"/>
+            </a:pPr>
+            <a:r>
+              <a:rPr lang="en-GB" dirty="0"/>
+              <a:t>Add the </a:t>
+            </a:r>
+            <a:r>
+              <a:rPr lang="en-GB" dirty="0" err="1"/>
+              <a:t>WindowsAzure.ServiceBus</a:t>
+            </a:r>
+            <a:r>
+              <a:rPr lang="en-GB" dirty="0"/>
+              <a:t> </a:t>
+            </a:r>
+            <a:r>
+              <a:rPr lang="en-GB" dirty="0" err="1"/>
+              <a:t>Nuget</a:t>
+            </a:r>
+            <a:r>
+              <a:rPr lang="en-GB" dirty="0"/>
+              <a:t> Package</a:t>
+            </a:r>
+          </a:p>
+          <a:p>
+            <a:pPr marL="742950" lvl="1" indent="-285750">
+              <a:buFont typeface="Arial" panose="020B0604020202020204" pitchFamily="34" charset="0"/>
+              <a:buChar char="•"/>
+            </a:pPr>
+            <a:r>
+              <a:rPr lang="en-GB" dirty="0"/>
+              <a:t>Connect to Azure using the connection string generated in the previous step.</a:t>
+            </a:r>
+          </a:p>
+          <a:p>
+            <a:pPr marL="742950" lvl="1" indent="-285750">
+              <a:buFont typeface="Arial" panose="020B0604020202020204" pitchFamily="34" charset="0"/>
+              <a:buChar char="•"/>
+            </a:pPr>
+            <a:r>
+              <a:rPr lang="en-GB" dirty="0"/>
+              <a:t>Now we can use an </a:t>
+            </a:r>
+            <a:r>
+              <a:rPr lang="en-GB" dirty="0" err="1"/>
+              <a:t>EventHubReciever</a:t>
+            </a:r>
+            <a:r>
+              <a:rPr lang="en-GB" dirty="0"/>
+              <a:t> to read messages from our device.</a:t>
+            </a:r>
+          </a:p>
+          <a:p>
+            <a:endParaRPr lang="en-GB" dirty="0"/>
+          </a:p>
+          <a:p>
+            <a:r>
+              <a:rPr lang="en-GB" dirty="0"/>
+              <a:t>Simulate an </a:t>
+            </a:r>
+            <a:r>
+              <a:rPr lang="en-GB" dirty="0" err="1"/>
+              <a:t>IoT</a:t>
+            </a:r>
+            <a:r>
+              <a:rPr lang="en-GB" dirty="0"/>
+              <a:t> Device</a:t>
+            </a:r>
+          </a:p>
+          <a:p>
+            <a:pPr marL="742950" lvl="1" indent="-285750">
+              <a:buFont typeface="Arial" panose="020B0604020202020204" pitchFamily="34" charset="0"/>
+              <a:buChar char="•"/>
+            </a:pPr>
+            <a:r>
+              <a:rPr lang="en-GB" dirty="0"/>
+              <a:t>In Visual Studio, Create another Console Application</a:t>
+            </a:r>
+          </a:p>
+          <a:p>
+            <a:pPr marL="742950" lvl="1" indent="-285750">
+              <a:buFont typeface="Arial" panose="020B0604020202020204" pitchFamily="34" charset="0"/>
+              <a:buChar char="•"/>
+            </a:pPr>
+            <a:r>
+              <a:rPr lang="en-GB" dirty="0"/>
+              <a:t>And install the </a:t>
+            </a:r>
+            <a:r>
+              <a:rPr lang="en-GB" dirty="0" err="1"/>
+              <a:t>Microsoft.Azure.Devices.Client</a:t>
+            </a:r>
+            <a:r>
+              <a:rPr lang="en-GB" dirty="0"/>
+              <a:t> </a:t>
+            </a:r>
+            <a:r>
+              <a:rPr lang="en-GB" dirty="0" err="1"/>
+              <a:t>Nuget</a:t>
+            </a:r>
+            <a:r>
+              <a:rPr lang="en-GB" dirty="0"/>
+              <a:t> Package</a:t>
+            </a:r>
+          </a:p>
+          <a:p>
+            <a:pPr marL="742950" lvl="1" indent="-285750">
+              <a:buFont typeface="Arial" panose="020B0604020202020204" pitchFamily="34" charset="0"/>
+              <a:buChar char="•"/>
+            </a:pPr>
+            <a:r>
+              <a:rPr lang="en-GB" dirty="0"/>
+              <a:t>Again, insert the connection string we created earlier</a:t>
+            </a:r>
+          </a:p>
+          <a:p>
+            <a:pPr marL="742950" lvl="1" indent="-285750">
+              <a:buFont typeface="Arial" panose="020B0604020202020204" pitchFamily="34" charset="0"/>
+              <a:buChar char="•"/>
+            </a:pPr>
+            <a:r>
+              <a:rPr lang="en-GB" dirty="0"/>
+              <a:t>This application send random wind speed data to out </a:t>
+            </a:r>
+            <a:r>
+              <a:rPr lang="en-GB" dirty="0" err="1"/>
+              <a:t>IoT</a:t>
+            </a:r>
+            <a:r>
+              <a:rPr lang="en-GB" dirty="0"/>
+              <a:t> Hub using a </a:t>
+            </a:r>
+            <a:r>
+              <a:rPr lang="en-GB" dirty="0" err="1"/>
+              <a:t>DeviceClient</a:t>
+            </a:r>
+            <a:endParaRPr lang="en-GB" dirty="0"/>
+          </a:p>
+          <a:p>
+            <a:pPr marL="742950" lvl="1" indent="-285750">
+              <a:buFont typeface="Arial" panose="020B0604020202020204" pitchFamily="34" charset="0"/>
+              <a:buChar char="•"/>
+            </a:pPr>
+            <a:endParaRPr lang="en-GB" dirty="0"/>
+          </a:p>
+        </p:txBody>
+      </p:sp>
+    </p:spTree>
+    <p:extLst>
+      <p:ext uri="{BB962C8B-B14F-4D97-AF65-F5344CB8AC3E}">
+        <p14:creationId xmlns:p14="http://schemas.microsoft.com/office/powerpoint/2010/main" val="4072559567"/>
+      </p:ext>
+    </p:extLst>
+  </p:cSld>
+  <p:clrMapOvr>
+    <a:masterClrMapping/>
+  </p:clrMapOvr>
+</p:sld>
+</file>
+
+<file path=ppt/slides/slide13.xml><?xml version="1.0" encoding="utf-8"?>
+<p:sld xmlns:a="http://schemas.openxmlformats.org/drawingml/2006/main" xmlns:r="http://schemas.openxmlformats.org/officeDocument/2006/relationships" xmlns:p="http://schemas.openxmlformats.org/presentationml/2006/main">
+  <p:cSld>
+    <p:spTree>
+      <p:nvGrpSpPr>
+        <p:cNvPr id="1" name=""/>
+        <p:cNvGrpSpPr/>
+        <p:nvPr/>
+      </p:nvGrpSpPr>
+      <p:grpSpPr>
+        <a:xfrm>
+          <a:off x="0" y="0"/>
+          <a:ext cx="0" cy="0"/>
+          <a:chOff x="0" y="0"/>
+          <a:chExt cx="0" cy="0"/>
+        </a:xfrm>
+      </p:grpSpPr>
+      <p:sp>
+        <p:nvSpPr>
+          <p:cNvPr id="2" name="TextBox 1"/>
+          <p:cNvSpPr txBox="1"/>
+          <p:nvPr/>
+        </p:nvSpPr>
+        <p:spPr>
+          <a:xfrm>
+            <a:off x="880844" y="318782"/>
+            <a:ext cx="10234569" cy="4524315"/>
+          </a:xfrm>
+          <a:prstGeom prst="rect">
+            <a:avLst/>
+          </a:prstGeom>
+          <a:noFill/>
+        </p:spPr>
+        <p:txBody>
+          <a:bodyPr wrap="square" rtlCol="0">
+            <a:spAutoFit/>
+          </a:bodyPr>
+          <a:lstStyle/>
+          <a:p>
+            <a:r>
+              <a:rPr lang="en-GB" dirty="0"/>
+              <a:t>The Big Finish</a:t>
+            </a:r>
+          </a:p>
+          <a:p>
+            <a:endParaRPr lang="en-GB" dirty="0"/>
+          </a:p>
+          <a:p>
+            <a:r>
+              <a:rPr lang="en-GB" dirty="0"/>
+              <a:t>Lets combine everything I have shown you today into a intruder alarm system.</a:t>
+            </a:r>
+          </a:p>
+          <a:p>
+            <a:endParaRPr lang="en-GB" dirty="0"/>
+          </a:p>
+          <a:p>
+            <a:r>
+              <a:rPr lang="en-GB" dirty="0"/>
+              <a:t>We will use two </a:t>
+            </a:r>
+            <a:r>
+              <a:rPr lang="en-GB" dirty="0" err="1"/>
+              <a:t>RPis</a:t>
+            </a:r>
+            <a:r>
+              <a:rPr lang="en-GB" dirty="0"/>
+              <a:t>, </a:t>
+            </a:r>
+          </a:p>
+          <a:p>
+            <a:r>
+              <a:rPr lang="en-GB" dirty="0"/>
+              <a:t>One will detect movement using a PIR sensor.</a:t>
+            </a:r>
+          </a:p>
+          <a:p>
+            <a:r>
+              <a:rPr lang="en-GB" dirty="0"/>
+              <a:t>The other will be the alarm system, were we will activate the alarm and sound a warning if an intruder is detected.</a:t>
+            </a:r>
+          </a:p>
+          <a:p>
+            <a:endParaRPr lang="en-GB" dirty="0"/>
+          </a:p>
+          <a:p>
+            <a:r>
+              <a:rPr lang="en-GB" dirty="0"/>
+              <a:t>There will be an </a:t>
+            </a:r>
+            <a:r>
+              <a:rPr lang="en-GB" dirty="0" err="1"/>
+              <a:t>IoT</a:t>
+            </a:r>
+            <a:r>
+              <a:rPr lang="en-GB" dirty="0"/>
+              <a:t> Hub in Azure. The idea is the when we arm the system a command will be set to the Hub telling the other device to arm, and send an alert message when movement is detected. The other device will subscribe to the alert message and raise the alarm if it receives a message.</a:t>
+            </a:r>
+          </a:p>
+          <a:p>
+            <a:endParaRPr lang="en-GB" dirty="0"/>
+          </a:p>
+          <a:p>
+            <a:r>
+              <a:rPr lang="en-GB" dirty="0"/>
+              <a:t>Stretch goal, the detection device will have a web cam attached and will capture an image and save it to Blob Storage. A background app will then send me a text message containing the pic.</a:t>
+            </a:r>
+          </a:p>
+          <a:p>
+            <a:endParaRPr lang="en-GB" dirty="0"/>
+          </a:p>
+        </p:txBody>
+      </p:sp>
+    </p:spTree>
+    <p:extLst>
+      <p:ext uri="{BB962C8B-B14F-4D97-AF65-F5344CB8AC3E}">
+        <p14:creationId xmlns:p14="http://schemas.microsoft.com/office/powerpoint/2010/main" val="3951336995"/>
+      </p:ext>
+    </p:extLst>
+  </p:cSld>
+  <p:clrMapOvr>
+    <a:masterClrMapping/>
+  </p:clrMapOvr>
+</p:sld>
+</file>
+
+<file path=ppt/slides/slide14.xml><?xml version="1.0" encoding="utf-8"?>
+<p:sld xmlns:a="http://schemas.openxmlformats.org/drawingml/2006/main" xmlns:r="http://schemas.openxmlformats.org/officeDocument/2006/relationships" xmlns:p="http://schemas.openxmlformats.org/presentationml/2006/main">
+  <p:cSld>
+    <p:spTree>
+      <p:nvGrpSpPr>
+        <p:cNvPr id="1" name=""/>
+        <p:cNvGrpSpPr/>
+        <p:nvPr/>
+      </p:nvGrpSpPr>
+      <p:grpSpPr>
+        <a:xfrm>
+          <a:off x="0" y="0"/>
+          <a:ext cx="0" cy="0"/>
+          <a:chOff x="0" y="0"/>
+          <a:chExt cx="0" cy="0"/>
+        </a:xfrm>
+      </p:grpSpPr>
+      <p:sp>
+        <p:nvSpPr>
+          <p:cNvPr id="2" name="TextBox 1"/>
+          <p:cNvSpPr txBox="1"/>
+          <p:nvPr/>
+        </p:nvSpPr>
+        <p:spPr>
+          <a:xfrm>
+            <a:off x="956345" y="436228"/>
+            <a:ext cx="10511405" cy="5078313"/>
+          </a:xfrm>
+          <a:prstGeom prst="rect">
+            <a:avLst/>
+          </a:prstGeom>
+          <a:noFill/>
+        </p:spPr>
+        <p:txBody>
+          <a:bodyPr wrap="square" rtlCol="0">
+            <a:spAutoFit/>
+          </a:bodyPr>
+          <a:lstStyle/>
+          <a:p>
+            <a:r>
+              <a:rPr lang="en-GB" dirty="0"/>
+              <a:t>Resources</a:t>
+            </a:r>
+          </a:p>
+          <a:p>
+            <a:endParaRPr lang="en-GB" dirty="0"/>
+          </a:p>
+          <a:p>
+            <a:r>
+              <a:rPr lang="en-GB" dirty="0">
+                <a:hlinkClick r:id="rId2"/>
+              </a:rPr>
+              <a:t>http://windowsondevices.com</a:t>
+            </a:r>
+            <a:r>
+              <a:rPr lang="en-GB" dirty="0"/>
+              <a:t> – to download Windows 10 for your </a:t>
+            </a:r>
+            <a:r>
+              <a:rPr lang="en-GB" dirty="0" err="1"/>
+              <a:t>RPi</a:t>
+            </a:r>
+            <a:r>
+              <a:rPr lang="en-GB" dirty="0"/>
+              <a:t>, plus documentation &amp; samples.</a:t>
+            </a:r>
+          </a:p>
+          <a:p>
+            <a:r>
+              <a:rPr lang="en-GB" dirty="0">
+                <a:hlinkClick r:id="rId3"/>
+              </a:rPr>
+              <a:t>http://insider.windows.com</a:t>
+            </a:r>
+            <a:r>
+              <a:rPr lang="en-GB" dirty="0"/>
+              <a:t> – to register for the insider program to gain access to pre-release Windows 10 images.</a:t>
+            </a:r>
+          </a:p>
+          <a:p>
+            <a:endParaRPr lang="en-GB" dirty="0"/>
+          </a:p>
+          <a:p>
+            <a:r>
+              <a:rPr lang="en-GB" dirty="0">
+                <a:hlinkClick r:id="rId4"/>
+              </a:rPr>
+              <a:t>http://adafruit.com</a:t>
+            </a:r>
+            <a:r>
+              <a:rPr lang="en-GB" dirty="0"/>
+              <a:t> &amp; </a:t>
+            </a:r>
+            <a:r>
+              <a:rPr lang="en-GB" dirty="0">
+                <a:hlinkClick r:id="rId5"/>
+              </a:rPr>
+              <a:t>http://sparkfun.com</a:t>
+            </a:r>
+            <a:r>
+              <a:rPr lang="en-GB" dirty="0"/>
+              <a:t> – Have lots of tutorials for </a:t>
+            </a:r>
+            <a:r>
+              <a:rPr lang="en-GB" dirty="0" err="1"/>
+              <a:t>RPi</a:t>
+            </a:r>
+            <a:r>
+              <a:rPr lang="en-GB" dirty="0"/>
+              <a:t> projects. </a:t>
+            </a:r>
+          </a:p>
+          <a:p>
+            <a:r>
+              <a:rPr lang="en-GB" dirty="0"/>
+              <a:t>But by your electronics from rs-online.com.</a:t>
+            </a:r>
+          </a:p>
+          <a:p>
+            <a:endParaRPr lang="en-GB" dirty="0"/>
+          </a:p>
+          <a:p>
+            <a:r>
+              <a:rPr lang="en-GB" dirty="0">
+                <a:hlinkClick r:id="rId6"/>
+              </a:rPr>
+              <a:t>http://hackerday.io</a:t>
+            </a:r>
+            <a:r>
+              <a:rPr lang="en-GB" dirty="0"/>
+              <a:t> &amp; </a:t>
+            </a:r>
+            <a:r>
+              <a:rPr lang="en-GB" dirty="0">
+                <a:hlinkClick r:id="rId7"/>
+              </a:rPr>
+              <a:t>http://hackster.io</a:t>
+            </a:r>
+            <a:r>
+              <a:rPr lang="en-GB" dirty="0"/>
+              <a:t> are places where you can share your projects with the community.</a:t>
+            </a:r>
+          </a:p>
+          <a:p>
+            <a:endParaRPr lang="en-GB" dirty="0"/>
+          </a:p>
+          <a:p>
+            <a:r>
+              <a:rPr lang="en-GB" dirty="0"/>
+              <a:t>Make: Electronics - </a:t>
+            </a:r>
+            <a:r>
+              <a:rPr lang="en-GB" dirty="0">
+                <a:hlinkClick r:id="rId8"/>
+              </a:rPr>
+              <a:t>http://www.amazon.co.uk/Make-Electronics-Learning-Discovery-Technology/dp/1680450263</a:t>
+            </a:r>
+            <a:r>
+              <a:rPr lang="en-GB" dirty="0"/>
+              <a:t> is a good beginners guide.</a:t>
+            </a:r>
+          </a:p>
+          <a:p>
+            <a:endParaRPr lang="en-GB" dirty="0"/>
+          </a:p>
+          <a:p>
+            <a:r>
+              <a:rPr lang="en-GB" dirty="0"/>
+              <a:t>Search Amazon for “Raspberry Pi Projects” to get a list of good project ideas books.</a:t>
+            </a:r>
+          </a:p>
+          <a:p>
+            <a:r>
+              <a:rPr lang="en-GB" dirty="0">
+                <a:hlinkClick r:id="rId9"/>
+              </a:rPr>
+              <a:t>http://www.amazon.co.uk/s/ref=nb_sb_noss_2?url=search-alias%3Dstripbooks&amp;field-keywords=Raspberry+Pi+projects</a:t>
+            </a:r>
+            <a:endParaRPr lang="en-GB" dirty="0"/>
+          </a:p>
+          <a:p>
+            <a:endParaRPr lang="en-GB" dirty="0"/>
+          </a:p>
+        </p:txBody>
+      </p:sp>
+    </p:spTree>
+    <p:extLst>
+      <p:ext uri="{BB962C8B-B14F-4D97-AF65-F5344CB8AC3E}">
+        <p14:creationId xmlns:p14="http://schemas.microsoft.com/office/powerpoint/2010/main" val="497994276"/>
+      </p:ext>
+    </p:extLst>
+  </p:cSld>
+  <p:clrMapOvr>
+    <a:masterClrMapping/>
+  </p:clrMapOvr>
+</p:sld>
+</file>
+
+<file path=ppt/slides/slide15.xml><?xml version="1.0" encoding="utf-8"?>
+<p:sld xmlns:a="http://schemas.openxmlformats.org/drawingml/2006/main" xmlns:r="http://schemas.openxmlformats.org/officeDocument/2006/relationships" xmlns:p="http://schemas.openxmlformats.org/presentationml/2006/main">
+  <p:cSld>
+    <p:spTree>
+      <p:nvGrpSpPr>
+        <p:cNvPr id="1" name=""/>
+        <p:cNvGrpSpPr/>
+        <p:nvPr/>
+      </p:nvGrpSpPr>
+      <p:grpSpPr>
+        <a:xfrm>
+          <a:off x="0" y="0"/>
+          <a:ext cx="0" cy="0"/>
+          <a:chOff x="0" y="0"/>
+          <a:chExt cx="0" cy="0"/>
+        </a:xfrm>
+      </p:grpSpPr>
+      <p:sp>
+        <p:nvSpPr>
+          <p:cNvPr id="2" name="Title 1"/>
+          <p:cNvSpPr>
+            <a:spLocks noGrp="1"/>
+          </p:cNvSpPr>
+          <p:nvPr>
+            <p:ph type="title"/>
+          </p:nvPr>
+        </p:nvSpPr>
+        <p:spPr/>
+        <p:txBody>
+          <a:bodyPr/>
+          <a:lstStyle/>
+          <a:p>
+            <a:endParaRPr lang="en-GB"/>
+          </a:p>
+        </p:txBody>
+      </p:sp>
+    </p:spTree>
+    <p:extLst>
+      <p:ext uri="{BB962C8B-B14F-4D97-AF65-F5344CB8AC3E}">
+        <p14:creationId xmlns:p14="http://schemas.microsoft.com/office/powerpoint/2010/main" val="2878914286"/>
       </p:ext>
     </p:extLst>
   </p:cSld>

</xml_diff>